<commit_message>
migrate to other server due to ws reasons
migrate to other server due to ws reasons
</commit_message>
<xml_diff>
--- a/presentation/Presentation1.pptx
+++ b/presentation/Presentation1.pptx
@@ -10,8 +10,9 @@
     <p:sldId id="257" r:id="rId4"/>
     <p:sldId id="259" r:id="rId5"/>
     <p:sldId id="261" r:id="rId6"/>
-    <p:sldId id="262" r:id="rId7"/>
-    <p:sldId id="264" r:id="rId8"/>
+    <p:sldId id="264" r:id="rId7"/>
+    <p:sldId id="265" r:id="rId8"/>
+    <p:sldId id="262" r:id="rId9"/>
   </p:sldIdLst>
   <p:sldSz cx="12192000" cy="6858000"/>
   <p:notesSz cx="6858000" cy="9144000"/>
@@ -9779,6 +9780,902 @@
       </p:grpSpPr>
       <p:sp useBgFill="1">
         <p:nvSpPr>
+          <p:cNvPr id="19" name="Rectangle 18">
+            <a:extLst>
+              <a:ext uri="{FF2B5EF4-FFF2-40B4-BE49-F238E27FC236}">
+                <a16:creationId xmlns:a16="http://schemas.microsoft.com/office/drawing/2014/main" id="{2B97F24A-32CE-4C1C-A50D-3016B394DCFB}"/>
+              </a:ext>
+              <a:ext uri="{C183D7F6-B498-43B3-948B-1728B52AA6E4}">
+                <adec:decorative xmlns:adec="http://schemas.microsoft.com/office/drawing/2017/decorative" val="1"/>
+              </a:ext>
+            </a:extLst>
+          </p:cNvPr>
+          <p:cNvSpPr>
+            <a:spLocks noGrp="1" noRot="1" noChangeAspect="1" noMove="1" noResize="1" noEditPoints="1" noAdjustHandles="1" noChangeArrowheads="1" noChangeShapeType="1" noTextEdit="1"/>
+          </p:cNvSpPr>
+          <p:nvPr>
+            <p:extLst>
+              <p:ext uri="{386F3935-93C4-4BCD-93E2-E3B085C9AB24}">
+                <p16:designElem xmlns:p16="http://schemas.microsoft.com/office/powerpoint/2015/main" val="1"/>
+              </p:ext>
+            </p:extLst>
+          </p:nvPr>
+        </p:nvSpPr>
+        <p:spPr>
+          <a:xfrm>
+            <a:off x="0" y="0"/>
+            <a:ext cx="12192000" cy="6858000"/>
+          </a:xfrm>
+          <a:prstGeom prst="rect">
+            <a:avLst/>
+          </a:prstGeom>
+          <a:ln>
+            <a:noFill/>
+          </a:ln>
+        </p:spPr>
+        <p:style>
+          <a:lnRef idx="2">
+            <a:schemeClr val="accent1">
+              <a:shade val="50000"/>
+            </a:schemeClr>
+          </a:lnRef>
+          <a:fillRef idx="1">
+            <a:schemeClr val="accent1"/>
+          </a:fillRef>
+          <a:effectRef idx="0">
+            <a:schemeClr val="accent1"/>
+          </a:effectRef>
+          <a:fontRef idx="minor">
+            <a:schemeClr val="lt1"/>
+          </a:fontRef>
+        </p:style>
+        <p:txBody>
+          <a:bodyPr rtlCol="0" anchor="ctr"/>
+          <a:lstStyle/>
+          <a:p>
+            <a:pPr algn="ctr"/>
+            <a:endParaRPr lang="en-US"/>
+          </a:p>
+        </p:txBody>
+      </p:sp>
+      <p:sp>
+        <p:nvSpPr>
+          <p:cNvPr id="2" name="Title 1">
+            <a:extLst>
+              <a:ext uri="{FF2B5EF4-FFF2-40B4-BE49-F238E27FC236}">
+                <a16:creationId xmlns:a16="http://schemas.microsoft.com/office/drawing/2014/main" id="{F412BC9B-CD94-85C8-1A97-32852B921DCE}"/>
+              </a:ext>
+            </a:extLst>
+          </p:cNvPr>
+          <p:cNvSpPr>
+            <a:spLocks noGrp="1"/>
+          </p:cNvSpPr>
+          <p:nvPr>
+            <p:ph type="ctrTitle"/>
+          </p:nvPr>
+        </p:nvSpPr>
+        <p:spPr>
+          <a:xfrm>
+            <a:off x="630936" y="639520"/>
+            <a:ext cx="3429000" cy="1719072"/>
+          </a:xfrm>
+        </p:spPr>
+        <p:txBody>
+          <a:bodyPr vert="horz" lIns="91440" tIns="45720" rIns="91440" bIns="45720" rtlCol="0" anchor="b">
+            <a:normAutofit/>
+          </a:bodyPr>
+          <a:lstStyle/>
+          <a:p>
+            <a:pPr algn="l"/>
+            <a:r>
+              <a:rPr lang="en-US" sz="5400" kern="1200">
+                <a:solidFill>
+                  <a:schemeClr val="tx1"/>
+                </a:solidFill>
+                <a:latin typeface="+mj-lt"/>
+                <a:ea typeface="+mj-ea"/>
+                <a:cs typeface="+mj-cs"/>
+              </a:rPr>
+              <a:t>Tech stack </a:t>
+            </a:r>
+          </a:p>
+        </p:txBody>
+      </p:sp>
+      <p:sp>
+        <p:nvSpPr>
+          <p:cNvPr id="21" name="sketch line">
+            <a:extLst>
+              <a:ext uri="{FF2B5EF4-FFF2-40B4-BE49-F238E27FC236}">
+                <a16:creationId xmlns:a16="http://schemas.microsoft.com/office/drawing/2014/main" id="{CD8B4F24-440B-49E9-B85D-733523DC064B}"/>
+              </a:ext>
+              <a:ext uri="{C183D7F6-B498-43B3-948B-1728B52AA6E4}">
+                <adec:decorative xmlns:adec="http://schemas.microsoft.com/office/drawing/2017/decorative" val="1"/>
+              </a:ext>
+            </a:extLst>
+          </p:cNvPr>
+          <p:cNvSpPr>
+            <a:spLocks noGrp="1" noRot="1" noChangeAspect="1" noMove="1" noResize="1" noEditPoints="1" noAdjustHandles="1" noChangeArrowheads="1" noChangeShapeType="1" noTextEdit="1"/>
+          </p:cNvSpPr>
+          <p:nvPr>
+            <p:extLst>
+              <p:ext uri="{386F3935-93C4-4BCD-93E2-E3B085C9AB24}">
+                <p16:designElem xmlns:p16="http://schemas.microsoft.com/office/powerpoint/2015/main" val="1"/>
+              </p:ext>
+            </p:extLst>
+          </p:nvPr>
+        </p:nvSpPr>
+        <p:spPr>
+          <a:xfrm>
+            <a:off x="643278" y="2573756"/>
+            <a:ext cx="3255095" cy="18288"/>
+          </a:xfrm>
+          <a:custGeom>
+            <a:avLst/>
+            <a:gdLst>
+              <a:gd name="connsiteX0" fmla="*/ 0 w 3255095"/>
+              <a:gd name="connsiteY0" fmla="*/ 0 h 18288"/>
+              <a:gd name="connsiteX1" fmla="*/ 618468 w 3255095"/>
+              <a:gd name="connsiteY1" fmla="*/ 0 h 18288"/>
+              <a:gd name="connsiteX2" fmla="*/ 1269487 w 3255095"/>
+              <a:gd name="connsiteY2" fmla="*/ 0 h 18288"/>
+              <a:gd name="connsiteX3" fmla="*/ 1953057 w 3255095"/>
+              <a:gd name="connsiteY3" fmla="*/ 0 h 18288"/>
+              <a:gd name="connsiteX4" fmla="*/ 2636627 w 3255095"/>
+              <a:gd name="connsiteY4" fmla="*/ 0 h 18288"/>
+              <a:gd name="connsiteX5" fmla="*/ 3255095 w 3255095"/>
+              <a:gd name="connsiteY5" fmla="*/ 0 h 18288"/>
+              <a:gd name="connsiteX6" fmla="*/ 3255095 w 3255095"/>
+              <a:gd name="connsiteY6" fmla="*/ 18288 h 18288"/>
+              <a:gd name="connsiteX7" fmla="*/ 2538974 w 3255095"/>
+              <a:gd name="connsiteY7" fmla="*/ 18288 h 18288"/>
+              <a:gd name="connsiteX8" fmla="*/ 1822853 w 3255095"/>
+              <a:gd name="connsiteY8" fmla="*/ 18288 h 18288"/>
+              <a:gd name="connsiteX9" fmla="*/ 1171834 w 3255095"/>
+              <a:gd name="connsiteY9" fmla="*/ 18288 h 18288"/>
+              <a:gd name="connsiteX10" fmla="*/ 0 w 3255095"/>
+              <a:gd name="connsiteY10" fmla="*/ 18288 h 18288"/>
+              <a:gd name="connsiteX11" fmla="*/ 0 w 3255095"/>
+              <a:gd name="connsiteY11" fmla="*/ 0 h 18288"/>
+            </a:gdLst>
+            <a:ahLst/>
+            <a:cxnLst>
+              <a:cxn ang="0">
+                <a:pos x="connsiteX0" y="connsiteY0"/>
+              </a:cxn>
+              <a:cxn ang="0">
+                <a:pos x="connsiteX1" y="connsiteY1"/>
+              </a:cxn>
+              <a:cxn ang="0">
+                <a:pos x="connsiteX2" y="connsiteY2"/>
+              </a:cxn>
+              <a:cxn ang="0">
+                <a:pos x="connsiteX3" y="connsiteY3"/>
+              </a:cxn>
+              <a:cxn ang="0">
+                <a:pos x="connsiteX4" y="connsiteY4"/>
+              </a:cxn>
+              <a:cxn ang="0">
+                <a:pos x="connsiteX5" y="connsiteY5"/>
+              </a:cxn>
+              <a:cxn ang="0">
+                <a:pos x="connsiteX6" y="connsiteY6"/>
+              </a:cxn>
+              <a:cxn ang="0">
+                <a:pos x="connsiteX7" y="connsiteY7"/>
+              </a:cxn>
+              <a:cxn ang="0">
+                <a:pos x="connsiteX8" y="connsiteY8"/>
+              </a:cxn>
+              <a:cxn ang="0">
+                <a:pos x="connsiteX9" y="connsiteY9"/>
+              </a:cxn>
+              <a:cxn ang="0">
+                <a:pos x="connsiteX10" y="connsiteY10"/>
+              </a:cxn>
+              <a:cxn ang="0">
+                <a:pos x="connsiteX11" y="connsiteY11"/>
+              </a:cxn>
+            </a:cxnLst>
+            <a:rect l="l" t="t" r="r" b="b"/>
+            <a:pathLst>
+              <a:path w="3255095" h="18288" fill="none" extrusionOk="0">
+                <a:moveTo>
+                  <a:pt x="0" y="0"/>
+                </a:moveTo>
+                <a:cubicBezTo>
+                  <a:pt x="240201" y="-22123"/>
+                  <a:pt x="462021" y="-19623"/>
+                  <a:pt x="618468" y="0"/>
+                </a:cubicBezTo>
+                <a:cubicBezTo>
+                  <a:pt x="774915" y="19623"/>
+                  <a:pt x="974734" y="2035"/>
+                  <a:pt x="1269487" y="0"/>
+                </a:cubicBezTo>
+                <a:cubicBezTo>
+                  <a:pt x="1564240" y="-2035"/>
+                  <a:pt x="1733579" y="10639"/>
+                  <a:pt x="1953057" y="0"/>
+                </a:cubicBezTo>
+                <a:cubicBezTo>
+                  <a:pt x="2172535" y="-10639"/>
+                  <a:pt x="2453962" y="14018"/>
+                  <a:pt x="2636627" y="0"/>
+                </a:cubicBezTo>
+                <a:cubicBezTo>
+                  <a:pt x="2819292" y="-14018"/>
+                  <a:pt x="3121375" y="5399"/>
+                  <a:pt x="3255095" y="0"/>
+                </a:cubicBezTo>
+                <a:cubicBezTo>
+                  <a:pt x="3254386" y="8157"/>
+                  <a:pt x="3254682" y="12125"/>
+                  <a:pt x="3255095" y="18288"/>
+                </a:cubicBezTo>
+                <a:cubicBezTo>
+                  <a:pt x="3088545" y="23203"/>
+                  <a:pt x="2687475" y="7419"/>
+                  <a:pt x="2538974" y="18288"/>
+                </a:cubicBezTo>
+                <a:cubicBezTo>
+                  <a:pt x="2390473" y="29157"/>
+                  <a:pt x="2137381" y="-8959"/>
+                  <a:pt x="1822853" y="18288"/>
+                </a:cubicBezTo>
+                <a:cubicBezTo>
+                  <a:pt x="1508325" y="45535"/>
+                  <a:pt x="1466437" y="20385"/>
+                  <a:pt x="1171834" y="18288"/>
+                </a:cubicBezTo>
+                <a:cubicBezTo>
+                  <a:pt x="877231" y="16191"/>
+                  <a:pt x="561097" y="37643"/>
+                  <a:pt x="0" y="18288"/>
+                </a:cubicBezTo>
+                <a:cubicBezTo>
+                  <a:pt x="-46" y="12483"/>
+                  <a:pt x="-203" y="6491"/>
+                  <a:pt x="0" y="0"/>
+                </a:cubicBezTo>
+                <a:close/>
+              </a:path>
+              <a:path w="3255095" h="18288" stroke="0" extrusionOk="0">
+                <a:moveTo>
+                  <a:pt x="0" y="0"/>
+                </a:moveTo>
+                <a:cubicBezTo>
+                  <a:pt x="291965" y="19429"/>
+                  <a:pt x="363155" y="8568"/>
+                  <a:pt x="618468" y="0"/>
+                </a:cubicBezTo>
+                <a:cubicBezTo>
+                  <a:pt x="873781" y="-8568"/>
+                  <a:pt x="904459" y="-19505"/>
+                  <a:pt x="1171834" y="0"/>
+                </a:cubicBezTo>
+                <a:cubicBezTo>
+                  <a:pt x="1439209" y="19505"/>
+                  <a:pt x="1744369" y="9790"/>
+                  <a:pt x="1887955" y="0"/>
+                </a:cubicBezTo>
+                <a:cubicBezTo>
+                  <a:pt x="2031541" y="-9790"/>
+                  <a:pt x="2346378" y="21240"/>
+                  <a:pt x="2506423" y="0"/>
+                </a:cubicBezTo>
+                <a:cubicBezTo>
+                  <a:pt x="2666468" y="-21240"/>
+                  <a:pt x="2990257" y="30414"/>
+                  <a:pt x="3255095" y="0"/>
+                </a:cubicBezTo>
+                <a:cubicBezTo>
+                  <a:pt x="3254831" y="4493"/>
+                  <a:pt x="3255479" y="9472"/>
+                  <a:pt x="3255095" y="18288"/>
+                </a:cubicBezTo>
+                <a:cubicBezTo>
+                  <a:pt x="3120743" y="16690"/>
+                  <a:pt x="2759628" y="42462"/>
+                  <a:pt x="2604076" y="18288"/>
+                </a:cubicBezTo>
+                <a:cubicBezTo>
+                  <a:pt x="2448524" y="-5886"/>
+                  <a:pt x="2184336" y="19599"/>
+                  <a:pt x="1887955" y="18288"/>
+                </a:cubicBezTo>
+                <a:cubicBezTo>
+                  <a:pt x="1591574" y="16977"/>
+                  <a:pt x="1548845" y="6870"/>
+                  <a:pt x="1334589" y="18288"/>
+                </a:cubicBezTo>
+                <a:cubicBezTo>
+                  <a:pt x="1120333" y="29706"/>
+                  <a:pt x="996014" y="9662"/>
+                  <a:pt x="683570" y="18288"/>
+                </a:cubicBezTo>
+                <a:cubicBezTo>
+                  <a:pt x="371126" y="26914"/>
+                  <a:pt x="198687" y="16167"/>
+                  <a:pt x="0" y="18288"/>
+                </a:cubicBezTo>
+                <a:cubicBezTo>
+                  <a:pt x="843" y="9577"/>
+                  <a:pt x="371" y="6900"/>
+                  <a:pt x="0" y="0"/>
+                </a:cubicBezTo>
+                <a:close/>
+              </a:path>
+            </a:pathLst>
+          </a:custGeom>
+          <a:solidFill>
+            <a:schemeClr val="accent2"/>
+          </a:solidFill>
+          <a:ln w="38100" cap="rnd">
+            <a:solidFill>
+              <a:schemeClr val="accent2"/>
+            </a:solidFill>
+            <a:round/>
+            <a:extLst>
+              <a:ext uri="{C807C97D-BFC1-408E-A445-0C87EB9F89A2}">
+                <ask:lineSketchStyleProps xmlns:ask="http://schemas.microsoft.com/office/drawing/2018/sketchyshapes" sd="1219033472">
+                  <a:prstGeom prst="rect">
+                    <a:avLst/>
+                  </a:prstGeom>
+                  <ask:type>
+                    <ask:lineSketchFreehand/>
+                  </ask:type>
+                </ask:lineSketchStyleProps>
+              </a:ext>
+            </a:extLst>
+          </a:ln>
+        </p:spPr>
+        <p:style>
+          <a:lnRef idx="2">
+            <a:schemeClr val="accent1">
+              <a:shade val="50000"/>
+            </a:schemeClr>
+          </a:lnRef>
+          <a:fillRef idx="1">
+            <a:schemeClr val="accent1"/>
+          </a:fillRef>
+          <a:effectRef idx="0">
+            <a:schemeClr val="accent1"/>
+          </a:effectRef>
+          <a:fontRef idx="minor">
+            <a:schemeClr val="lt1"/>
+          </a:fontRef>
+        </p:style>
+        <p:txBody>
+          <a:bodyPr rtlCol="0" anchor="ctr"/>
+          <a:lstStyle/>
+          <a:p>
+            <a:pPr algn="ctr"/>
+            <a:endParaRPr lang="en-US"/>
+          </a:p>
+        </p:txBody>
+      </p:sp>
+      <p:sp>
+        <p:nvSpPr>
+          <p:cNvPr id="3" name="Subtitle 2">
+            <a:extLst>
+              <a:ext uri="{FF2B5EF4-FFF2-40B4-BE49-F238E27FC236}">
+                <a16:creationId xmlns:a16="http://schemas.microsoft.com/office/drawing/2014/main" id="{31DFE856-0313-5FCD-B353-7FD58304E16D}"/>
+              </a:ext>
+            </a:extLst>
+          </p:cNvPr>
+          <p:cNvSpPr>
+            <a:spLocks noGrp="1"/>
+          </p:cNvSpPr>
+          <p:nvPr>
+            <p:ph type="subTitle" idx="1"/>
+          </p:nvPr>
+        </p:nvSpPr>
+        <p:spPr>
+          <a:xfrm>
+            <a:off x="630936" y="2807208"/>
+            <a:ext cx="3429000" cy="3410712"/>
+          </a:xfrm>
+        </p:spPr>
+        <p:txBody>
+          <a:bodyPr vert="horz" lIns="91440" tIns="45720" rIns="91440" bIns="45720" rtlCol="0" anchor="t">
+            <a:normAutofit lnSpcReduction="10000"/>
+          </a:bodyPr>
+          <a:lstStyle/>
+          <a:p>
+            <a:pPr indent="-228600" algn="l">
+              <a:buFont typeface="Arial" panose="020B0604020202020204" pitchFamily="34" charset="0"/>
+              <a:buChar char="•"/>
+            </a:pPr>
+            <a:r>
+              <a:rPr lang="en-US" sz="2200" dirty="0"/>
+              <a:t>Smart contracts: </a:t>
+            </a:r>
+          </a:p>
+          <a:p>
+            <a:pPr lvl="1" indent="-228600" algn="l">
+              <a:buFont typeface="Arial" panose="020B0604020202020204" pitchFamily="34" charset="0"/>
+              <a:buChar char="•"/>
+            </a:pPr>
+            <a:r>
+              <a:rPr lang="en-US" sz="1800" dirty="0"/>
+              <a:t>Move</a:t>
+            </a:r>
+          </a:p>
+          <a:p>
+            <a:pPr indent="-228600" algn="l">
+              <a:buFont typeface="Arial" panose="020B0604020202020204" pitchFamily="34" charset="0"/>
+              <a:buChar char="•"/>
+            </a:pPr>
+            <a:r>
+              <a:rPr lang="en-US" sz="2200" dirty="0"/>
+              <a:t>Frontend: </a:t>
+            </a:r>
+          </a:p>
+          <a:p>
+            <a:pPr lvl="1" indent="-228600" algn="l">
+              <a:buFont typeface="Arial" panose="020B0604020202020204" pitchFamily="34" charset="0"/>
+              <a:buChar char="•"/>
+            </a:pPr>
+            <a:r>
+              <a:rPr lang="en-US" sz="1800" dirty="0"/>
+              <a:t>ReactJS</a:t>
+            </a:r>
+          </a:p>
+          <a:p>
+            <a:pPr lvl="1" indent="-228600" algn="l">
+              <a:buFont typeface="Arial" panose="020B0604020202020204" pitchFamily="34" charset="0"/>
+              <a:buChar char="•"/>
+            </a:pPr>
+            <a:r>
+              <a:rPr lang="en-US" sz="1800" dirty="0"/>
+              <a:t>docker</a:t>
+            </a:r>
+          </a:p>
+          <a:p>
+            <a:pPr indent="-228600" algn="l">
+              <a:buFont typeface="Arial" panose="020B0604020202020204" pitchFamily="34" charset="0"/>
+              <a:buChar char="•"/>
+            </a:pPr>
+            <a:r>
+              <a:rPr lang="en-US" sz="2200" dirty="0"/>
+              <a:t>Indexer: </a:t>
+            </a:r>
+          </a:p>
+          <a:p>
+            <a:pPr lvl="1" indent="-228600" algn="l">
+              <a:buFont typeface="Arial" panose="020B0604020202020204" pitchFamily="34" charset="0"/>
+              <a:buChar char="•"/>
+            </a:pPr>
+            <a:r>
+              <a:rPr lang="en-US" sz="1800" dirty="0" err="1"/>
+              <a:t>NodeJs</a:t>
+            </a:r>
+            <a:r>
+              <a:rPr lang="en-US" sz="1800" dirty="0"/>
+              <a:t> </a:t>
+            </a:r>
+          </a:p>
+          <a:p>
+            <a:pPr lvl="1" indent="-228600" algn="l">
+              <a:buFont typeface="Arial" panose="020B0604020202020204" pitchFamily="34" charset="0"/>
+              <a:buChar char="•"/>
+            </a:pPr>
+            <a:r>
+              <a:rPr lang="en-US" sz="1800" dirty="0"/>
+              <a:t>SUI </a:t>
+            </a:r>
+            <a:r>
+              <a:rPr lang="en-US" sz="1800" dirty="0" err="1"/>
+              <a:t>websockets</a:t>
+            </a:r>
+            <a:endParaRPr lang="en-US" sz="1800" dirty="0"/>
+          </a:p>
+          <a:p>
+            <a:pPr lvl="1" indent="-228600" algn="l">
+              <a:buFont typeface="Arial" panose="020B0604020202020204" pitchFamily="34" charset="0"/>
+              <a:buChar char="•"/>
+            </a:pPr>
+            <a:r>
+              <a:rPr lang="en-US" sz="1800" dirty="0"/>
+              <a:t>MongoDB</a:t>
+            </a:r>
+          </a:p>
+          <a:p>
+            <a:pPr lvl="1" indent="-228600" algn="l">
+              <a:buFont typeface="Arial" panose="020B0604020202020204" pitchFamily="34" charset="0"/>
+              <a:buChar char="•"/>
+            </a:pPr>
+            <a:r>
+              <a:rPr lang="en-US" sz="1800" dirty="0"/>
+              <a:t>docker</a:t>
+            </a:r>
+          </a:p>
+        </p:txBody>
+      </p:sp>
+      <p:pic>
+        <p:nvPicPr>
+          <p:cNvPr id="14" name="Picture 13" descr="A diagram of a computer server&#10;&#10;Description automatically generated">
+            <a:extLst>
+              <a:ext uri="{FF2B5EF4-FFF2-40B4-BE49-F238E27FC236}">
+                <a16:creationId xmlns:a16="http://schemas.microsoft.com/office/drawing/2014/main" id="{6692023A-B218-720E-26BD-C36D6F208685}"/>
+              </a:ext>
+            </a:extLst>
+          </p:cNvPr>
+          <p:cNvPicPr>
+            <a:picLocks noChangeAspect="1"/>
+          </p:cNvPicPr>
+          <p:nvPr/>
+        </p:nvPicPr>
+        <p:blipFill>
+          <a:blip r:embed="rId2"/>
+          <a:stretch>
+            <a:fillRect/>
+          </a:stretch>
+        </p:blipFill>
+        <p:spPr>
+          <a:xfrm>
+            <a:off x="4654296" y="1116255"/>
+            <a:ext cx="6903720" cy="4625490"/>
+          </a:xfrm>
+          <a:prstGeom prst="rect">
+            <a:avLst/>
+          </a:prstGeom>
+        </p:spPr>
+      </p:pic>
+    </p:spTree>
+    <p:extLst>
+      <p:ext uri="{BB962C8B-B14F-4D97-AF65-F5344CB8AC3E}">
+        <p14:creationId xmlns:p14="http://schemas.microsoft.com/office/powerpoint/2010/main" val="1034258263"/>
+      </p:ext>
+    </p:extLst>
+  </p:cSld>
+  <p:clrMapOvr>
+    <a:masterClrMapping/>
+  </p:clrMapOvr>
+</p:sld>
+</file>
+
+<file path=ppt/slides/slide7.xml><?xml version="1.0" encoding="utf-8"?>
+<p:sld xmlns:a="http://schemas.openxmlformats.org/drawingml/2006/main" xmlns:r="http://schemas.openxmlformats.org/officeDocument/2006/relationships" xmlns:p="http://schemas.openxmlformats.org/presentationml/2006/main">
+  <p:cSld>
+    <p:bg>
+      <p:bgPr>
+        <a:solidFill>
+          <a:schemeClr val="bg1"/>
+        </a:solidFill>
+        <a:effectLst/>
+      </p:bgPr>
+    </p:bg>
+    <p:spTree>
+      <p:nvGrpSpPr>
+        <p:cNvPr id="1" name=""/>
+        <p:cNvGrpSpPr/>
+        <p:nvPr/>
+      </p:nvGrpSpPr>
+      <p:grpSpPr>
+        <a:xfrm>
+          <a:off x="0" y="0"/>
+          <a:ext cx="0" cy="0"/>
+          <a:chOff x="0" y="0"/>
+          <a:chExt cx="0" cy="0"/>
+        </a:xfrm>
+      </p:grpSpPr>
+      <p:sp useBgFill="1">
+        <p:nvSpPr>
+          <p:cNvPr id="41" name="Rectangle 40">
+            <a:extLst>
+              <a:ext uri="{FF2B5EF4-FFF2-40B4-BE49-F238E27FC236}">
+                <a16:creationId xmlns:a16="http://schemas.microsoft.com/office/drawing/2014/main" id="{7D9D36D6-2AC5-46A1-A849-4C82D5264A3A}"/>
+              </a:ext>
+              <a:ext uri="{C183D7F6-B498-43B3-948B-1728B52AA6E4}">
+                <adec:decorative xmlns:adec="http://schemas.microsoft.com/office/drawing/2017/decorative" val="1"/>
+              </a:ext>
+            </a:extLst>
+          </p:cNvPr>
+          <p:cNvSpPr>
+            <a:spLocks noGrp="1" noRot="1" noChangeAspect="1" noMove="1" noResize="1" noEditPoints="1" noAdjustHandles="1" noChangeArrowheads="1" noChangeShapeType="1" noTextEdit="1"/>
+          </p:cNvSpPr>
+          <p:nvPr>
+            <p:extLst>
+              <p:ext uri="{386F3935-93C4-4BCD-93E2-E3B085C9AB24}">
+                <p16:designElem xmlns:p16="http://schemas.microsoft.com/office/powerpoint/2015/main" val="1"/>
+              </p:ext>
+            </p:extLst>
+          </p:nvPr>
+        </p:nvSpPr>
+        <p:spPr>
+          <a:xfrm>
+            <a:off x="-1" y="0"/>
+            <a:ext cx="12188952" cy="6858000"/>
+          </a:xfrm>
+          <a:prstGeom prst="rect">
+            <a:avLst/>
+          </a:prstGeom>
+          <a:ln>
+            <a:noFill/>
+          </a:ln>
+        </p:spPr>
+        <p:style>
+          <a:lnRef idx="2">
+            <a:schemeClr val="accent1">
+              <a:shade val="50000"/>
+            </a:schemeClr>
+          </a:lnRef>
+          <a:fillRef idx="1">
+            <a:schemeClr val="accent1"/>
+          </a:fillRef>
+          <a:effectRef idx="0">
+            <a:schemeClr val="accent1"/>
+          </a:effectRef>
+          <a:fontRef idx="minor">
+            <a:schemeClr val="lt1"/>
+          </a:fontRef>
+        </p:style>
+        <p:txBody>
+          <a:bodyPr rtlCol="0" anchor="ctr"/>
+          <a:lstStyle/>
+          <a:p>
+            <a:pPr algn="ctr"/>
+            <a:endParaRPr lang="en-US" dirty="0"/>
+          </a:p>
+        </p:txBody>
+      </p:sp>
+      <p:sp>
+        <p:nvSpPr>
+          <p:cNvPr id="2" name="Title 1">
+            <a:extLst>
+              <a:ext uri="{FF2B5EF4-FFF2-40B4-BE49-F238E27FC236}">
+                <a16:creationId xmlns:a16="http://schemas.microsoft.com/office/drawing/2014/main" id="{F412BC9B-CD94-85C8-1A97-32852B921DCE}"/>
+              </a:ext>
+            </a:extLst>
+          </p:cNvPr>
+          <p:cNvSpPr>
+            <a:spLocks noGrp="1"/>
+          </p:cNvSpPr>
+          <p:nvPr>
+            <p:ph type="ctrTitle"/>
+          </p:nvPr>
+        </p:nvSpPr>
+        <p:spPr>
+          <a:xfrm>
+            <a:off x="5354955" y="552182"/>
+            <a:ext cx="5998840" cy="3343135"/>
+          </a:xfrm>
+          <a:noFill/>
+        </p:spPr>
+        <p:txBody>
+          <a:bodyPr vert="horz" lIns="91440" tIns="45720" rIns="91440" bIns="45720" rtlCol="0">
+            <a:normAutofit/>
+          </a:bodyPr>
+          <a:lstStyle/>
+          <a:p>
+            <a:pPr algn="l"/>
+            <a:r>
+              <a:rPr lang="en-US" sz="5200" kern="1200" dirty="0">
+                <a:latin typeface="+mj-lt"/>
+                <a:ea typeface="+mj-ea"/>
+                <a:cs typeface="+mj-cs"/>
+              </a:rPr>
+              <a:t>Contract flow overview</a:t>
+            </a:r>
+          </a:p>
+        </p:txBody>
+      </p:sp>
+      <p:sp>
+        <p:nvSpPr>
+          <p:cNvPr id="3" name="Subtitle 2">
+            <a:extLst>
+              <a:ext uri="{FF2B5EF4-FFF2-40B4-BE49-F238E27FC236}">
+                <a16:creationId xmlns:a16="http://schemas.microsoft.com/office/drawing/2014/main" id="{31DFE856-0313-5FCD-B353-7FD58304E16D}"/>
+              </a:ext>
+            </a:extLst>
+          </p:cNvPr>
+          <p:cNvSpPr>
+            <a:spLocks noGrp="1"/>
+          </p:cNvSpPr>
+          <p:nvPr>
+            <p:ph type="subTitle" idx="1"/>
+          </p:nvPr>
+        </p:nvSpPr>
+        <p:spPr>
+          <a:xfrm>
+            <a:off x="5354955" y="4067032"/>
+            <a:ext cx="5998840" cy="2067068"/>
+          </a:xfrm>
+          <a:noFill/>
+        </p:spPr>
+        <p:txBody>
+          <a:bodyPr vert="horz" lIns="91440" tIns="45720" rIns="91440" bIns="45720" rtlCol="0">
+            <a:normAutofit/>
+          </a:bodyPr>
+          <a:lstStyle/>
+          <a:p>
+            <a:pPr indent="-228600" algn="l">
+              <a:buFont typeface="Arial" panose="020B0604020202020204" pitchFamily="34" charset="0"/>
+              <a:buChar char="•"/>
+            </a:pPr>
+            <a:r>
+              <a:rPr lang="en-US" dirty="0"/>
+              <a:t>Everyone can interact with the lottery factory</a:t>
+            </a:r>
+          </a:p>
+          <a:p>
+            <a:pPr indent="-228600" algn="l">
+              <a:buFont typeface="Arial" panose="020B0604020202020204" pitchFamily="34" charset="0"/>
+              <a:buChar char="•"/>
+            </a:pPr>
+            <a:r>
+              <a:rPr lang="en-US" dirty="0"/>
+              <a:t>Team owns nothing, everyone can buy protocol fees for </a:t>
+            </a:r>
+            <a:r>
+              <a:rPr lang="en-US"/>
+              <a:t>subsequent epochs</a:t>
+            </a:r>
+          </a:p>
+        </p:txBody>
+      </p:sp>
+      <p:pic>
+        <p:nvPicPr>
+          <p:cNvPr id="5" name="Picture 4" descr="A screen shot of a black background&#10;&#10;Description automatically generated">
+            <a:extLst>
+              <a:ext uri="{FF2B5EF4-FFF2-40B4-BE49-F238E27FC236}">
+                <a16:creationId xmlns:a16="http://schemas.microsoft.com/office/drawing/2014/main" id="{A2A3BB16-E098-C393-6D06-364E26143838}"/>
+              </a:ext>
+            </a:extLst>
+          </p:cNvPr>
+          <p:cNvPicPr>
+            <a:picLocks noChangeAspect="1"/>
+          </p:cNvPicPr>
+          <p:nvPr/>
+        </p:nvPicPr>
+        <p:blipFill rotWithShape="1">
+          <a:blip r:embed="rId2"/>
+          <a:srcRect r="-1" b="3853"/>
+          <a:stretch/>
+        </p:blipFill>
+        <p:spPr>
+          <a:xfrm>
+            <a:off x="20" y="10"/>
+            <a:ext cx="4992985" cy="6857990"/>
+          </a:xfrm>
+          <a:prstGeom prst="rect">
+            <a:avLst/>
+          </a:prstGeom>
+        </p:spPr>
+      </p:pic>
+    </p:spTree>
+    <p:extLst>
+      <p:ext uri="{BB962C8B-B14F-4D97-AF65-F5344CB8AC3E}">
+        <p14:creationId xmlns:p14="http://schemas.microsoft.com/office/powerpoint/2010/main" val="4204185783"/>
+      </p:ext>
+    </p:extLst>
+  </p:cSld>
+  <p:clrMapOvr>
+    <a:masterClrMapping/>
+  </p:clrMapOvr>
+  <p:timing>
+    <p:tnLst>
+      <p:par>
+        <p:cTn id="1" dur="indefinite" restart="never" nodeType="tmRoot">
+          <p:childTnLst>
+            <p:seq concurrent="1" nextAc="seek">
+              <p:cTn id="2" dur="indefinite" nodeType="mainSeq">
+                <p:childTnLst>
+                  <p:par>
+                    <p:cTn id="3" fill="hold">
+                      <p:stCondLst>
+                        <p:cond delay="indefinite"/>
+                        <p:cond evt="onBegin" delay="0">
+                          <p:tn val="2"/>
+                        </p:cond>
+                      </p:stCondLst>
+                      <p:childTnLst>
+                        <p:par>
+                          <p:cTn id="4" fill="hold">
+                            <p:stCondLst>
+                              <p:cond delay="0"/>
+                            </p:stCondLst>
+                            <p:childTnLst>
+                              <p:par>
+                                <p:cTn id="5" presetID="10" presetClass="entr" presetSubtype="0" fill="hold" grpId="0" nodeType="withEffect">
+                                  <p:stCondLst>
+                                    <p:cond delay="1000"/>
+                                  </p:stCondLst>
+                                  <p:iterate type="lt">
+                                    <p:tmPct val="10000"/>
+                                  </p:iterate>
+                                  <p:childTnLst>
+                                    <p:set>
+                                      <p:cBhvr>
+                                        <p:cTn id="6" dur="1" fill="hold">
+                                          <p:stCondLst>
+                                            <p:cond delay="0"/>
+                                          </p:stCondLst>
+                                        </p:cTn>
+                                        <p:tgtEl>
+                                          <p:spTgt spid="2"/>
+                                        </p:tgtEl>
+                                        <p:attrNameLst>
+                                          <p:attrName>style.visibility</p:attrName>
+                                        </p:attrNameLst>
+                                      </p:cBhvr>
+                                      <p:to>
+                                        <p:strVal val="visible"/>
+                                      </p:to>
+                                    </p:set>
+                                    <p:animEffect transition="in" filter="fade">
+                                      <p:cBhvr>
+                                        <p:cTn id="7" dur="400"/>
+                                        <p:tgtEl>
+                                          <p:spTgt spid="2"/>
+                                        </p:tgtEl>
+                                      </p:cBhvr>
+                                    </p:animEffect>
+                                  </p:childTnLst>
+                                </p:cTn>
+                              </p:par>
+                            </p:childTnLst>
+                          </p:cTn>
+                        </p:par>
+                      </p:childTnLst>
+                    </p:cTn>
+                  </p:par>
+                </p:childTnLst>
+              </p:cTn>
+              <p:prevCondLst>
+                <p:cond evt="onPrev" delay="0">
+                  <p:tgtEl>
+                    <p:sldTgt/>
+                  </p:tgtEl>
+                </p:cond>
+              </p:prevCondLst>
+              <p:nextCondLst>
+                <p:cond evt="onNext" delay="0">
+                  <p:tgtEl>
+                    <p:sldTgt/>
+                  </p:tgtEl>
+                </p:cond>
+              </p:nextCondLst>
+            </p:seq>
+          </p:childTnLst>
+        </p:cTn>
+      </p:par>
+    </p:tnLst>
+    <p:bldLst>
+      <p:bldP spid="2" grpId="0"/>
+    </p:bldLst>
+  </p:timing>
+</p:sld>
+</file>
+
+<file path=ppt/slides/slide8.xml><?xml version="1.0" encoding="utf-8"?>
+<p:sld xmlns:a="http://schemas.openxmlformats.org/drawingml/2006/main" xmlns:r="http://schemas.openxmlformats.org/officeDocument/2006/relationships" xmlns:p="http://schemas.openxmlformats.org/presentationml/2006/main">
+  <p:cSld>
+    <p:bg>
+      <p:bgPr>
+        <a:solidFill>
+          <a:schemeClr val="bg1"/>
+        </a:solidFill>
+        <a:effectLst/>
+      </p:bgPr>
+    </p:bg>
+    <p:spTree>
+      <p:nvGrpSpPr>
+        <p:cNvPr id="1" name=""/>
+        <p:cNvGrpSpPr/>
+        <p:nvPr/>
+      </p:nvGrpSpPr>
+      <p:grpSpPr>
+        <a:xfrm>
+          <a:off x="0" y="0"/>
+          <a:ext cx="0" cy="0"/>
+          <a:chOff x="0" y="0"/>
+          <a:chExt cx="0" cy="0"/>
+        </a:xfrm>
+      </p:grpSpPr>
+      <p:sp useBgFill="1">
+        <p:nvSpPr>
           <p:cNvPr id="17" name="Rectangle 16">
             <a:extLst>
               <a:ext uri="{FF2B5EF4-FFF2-40B4-BE49-F238E27FC236}">
@@ -10285,588 +11182,6 @@
     <p:extLst>
       <p:ext uri="{BB962C8B-B14F-4D97-AF65-F5344CB8AC3E}">
         <p14:creationId xmlns:p14="http://schemas.microsoft.com/office/powerpoint/2010/main" val="2794736766"/>
-      </p:ext>
-    </p:extLst>
-  </p:cSld>
-  <p:clrMapOvr>
-    <a:masterClrMapping/>
-  </p:clrMapOvr>
-</p:sld>
-</file>
-
-<file path=ppt/slides/slide7.xml><?xml version="1.0" encoding="utf-8"?>
-<p:sld xmlns:a="http://schemas.openxmlformats.org/drawingml/2006/main" xmlns:r="http://schemas.openxmlformats.org/officeDocument/2006/relationships" xmlns:p="http://schemas.openxmlformats.org/presentationml/2006/main">
-  <p:cSld>
-    <p:bg>
-      <p:bgPr>
-        <a:solidFill>
-          <a:schemeClr val="bg1"/>
-        </a:solidFill>
-        <a:effectLst/>
-      </p:bgPr>
-    </p:bg>
-    <p:spTree>
-      <p:nvGrpSpPr>
-        <p:cNvPr id="1" name=""/>
-        <p:cNvGrpSpPr/>
-        <p:nvPr/>
-      </p:nvGrpSpPr>
-      <p:grpSpPr>
-        <a:xfrm>
-          <a:off x="0" y="0"/>
-          <a:ext cx="0" cy="0"/>
-          <a:chOff x="0" y="0"/>
-          <a:chExt cx="0" cy="0"/>
-        </a:xfrm>
-      </p:grpSpPr>
-      <p:sp useBgFill="1">
-        <p:nvSpPr>
-          <p:cNvPr id="19" name="Rectangle 18">
-            <a:extLst>
-              <a:ext uri="{FF2B5EF4-FFF2-40B4-BE49-F238E27FC236}">
-                <a16:creationId xmlns:a16="http://schemas.microsoft.com/office/drawing/2014/main" id="{2B97F24A-32CE-4C1C-A50D-3016B394DCFB}"/>
-              </a:ext>
-              <a:ext uri="{C183D7F6-B498-43B3-948B-1728B52AA6E4}">
-                <adec:decorative xmlns:adec="http://schemas.microsoft.com/office/drawing/2017/decorative" val="1"/>
-              </a:ext>
-            </a:extLst>
-          </p:cNvPr>
-          <p:cNvSpPr>
-            <a:spLocks noGrp="1" noRot="1" noChangeAspect="1" noMove="1" noResize="1" noEditPoints="1" noAdjustHandles="1" noChangeArrowheads="1" noChangeShapeType="1" noTextEdit="1"/>
-          </p:cNvSpPr>
-          <p:nvPr>
-            <p:extLst>
-              <p:ext uri="{386F3935-93C4-4BCD-93E2-E3B085C9AB24}">
-                <p16:designElem xmlns:p16="http://schemas.microsoft.com/office/powerpoint/2015/main" val="1"/>
-              </p:ext>
-            </p:extLst>
-          </p:nvPr>
-        </p:nvSpPr>
-        <p:spPr>
-          <a:xfrm>
-            <a:off x="0" y="0"/>
-            <a:ext cx="12192000" cy="6858000"/>
-          </a:xfrm>
-          <a:prstGeom prst="rect">
-            <a:avLst/>
-          </a:prstGeom>
-          <a:ln>
-            <a:noFill/>
-          </a:ln>
-        </p:spPr>
-        <p:style>
-          <a:lnRef idx="2">
-            <a:schemeClr val="accent1">
-              <a:shade val="50000"/>
-            </a:schemeClr>
-          </a:lnRef>
-          <a:fillRef idx="1">
-            <a:schemeClr val="accent1"/>
-          </a:fillRef>
-          <a:effectRef idx="0">
-            <a:schemeClr val="accent1"/>
-          </a:effectRef>
-          <a:fontRef idx="minor">
-            <a:schemeClr val="lt1"/>
-          </a:fontRef>
-        </p:style>
-        <p:txBody>
-          <a:bodyPr rtlCol="0" anchor="ctr"/>
-          <a:lstStyle/>
-          <a:p>
-            <a:pPr algn="ctr"/>
-            <a:endParaRPr lang="en-US"/>
-          </a:p>
-        </p:txBody>
-      </p:sp>
-      <p:sp>
-        <p:nvSpPr>
-          <p:cNvPr id="2" name="Title 1">
-            <a:extLst>
-              <a:ext uri="{FF2B5EF4-FFF2-40B4-BE49-F238E27FC236}">
-                <a16:creationId xmlns:a16="http://schemas.microsoft.com/office/drawing/2014/main" id="{F412BC9B-CD94-85C8-1A97-32852B921DCE}"/>
-              </a:ext>
-            </a:extLst>
-          </p:cNvPr>
-          <p:cNvSpPr>
-            <a:spLocks noGrp="1"/>
-          </p:cNvSpPr>
-          <p:nvPr>
-            <p:ph type="ctrTitle"/>
-          </p:nvPr>
-        </p:nvSpPr>
-        <p:spPr>
-          <a:xfrm>
-            <a:off x="630936" y="639520"/>
-            <a:ext cx="3429000" cy="1719072"/>
-          </a:xfrm>
-        </p:spPr>
-        <p:txBody>
-          <a:bodyPr vert="horz" lIns="91440" tIns="45720" rIns="91440" bIns="45720" rtlCol="0" anchor="b">
-            <a:normAutofit/>
-          </a:bodyPr>
-          <a:lstStyle/>
-          <a:p>
-            <a:pPr algn="l"/>
-            <a:r>
-              <a:rPr lang="en-US" sz="5400" kern="1200">
-                <a:solidFill>
-                  <a:schemeClr val="tx1"/>
-                </a:solidFill>
-                <a:latin typeface="+mj-lt"/>
-                <a:ea typeface="+mj-ea"/>
-                <a:cs typeface="+mj-cs"/>
-              </a:rPr>
-              <a:t>Tech stack </a:t>
-            </a:r>
-          </a:p>
-        </p:txBody>
-      </p:sp>
-      <p:sp>
-        <p:nvSpPr>
-          <p:cNvPr id="21" name="sketch line">
-            <a:extLst>
-              <a:ext uri="{FF2B5EF4-FFF2-40B4-BE49-F238E27FC236}">
-                <a16:creationId xmlns:a16="http://schemas.microsoft.com/office/drawing/2014/main" id="{CD8B4F24-440B-49E9-B85D-733523DC064B}"/>
-              </a:ext>
-              <a:ext uri="{C183D7F6-B498-43B3-948B-1728B52AA6E4}">
-                <adec:decorative xmlns:adec="http://schemas.microsoft.com/office/drawing/2017/decorative" val="1"/>
-              </a:ext>
-            </a:extLst>
-          </p:cNvPr>
-          <p:cNvSpPr>
-            <a:spLocks noGrp="1" noRot="1" noChangeAspect="1" noMove="1" noResize="1" noEditPoints="1" noAdjustHandles="1" noChangeArrowheads="1" noChangeShapeType="1" noTextEdit="1"/>
-          </p:cNvSpPr>
-          <p:nvPr>
-            <p:extLst>
-              <p:ext uri="{386F3935-93C4-4BCD-93E2-E3B085C9AB24}">
-                <p16:designElem xmlns:p16="http://schemas.microsoft.com/office/powerpoint/2015/main" val="1"/>
-              </p:ext>
-            </p:extLst>
-          </p:nvPr>
-        </p:nvSpPr>
-        <p:spPr>
-          <a:xfrm>
-            <a:off x="643278" y="2573756"/>
-            <a:ext cx="3255095" cy="18288"/>
-          </a:xfrm>
-          <a:custGeom>
-            <a:avLst/>
-            <a:gdLst>
-              <a:gd name="connsiteX0" fmla="*/ 0 w 3255095"/>
-              <a:gd name="connsiteY0" fmla="*/ 0 h 18288"/>
-              <a:gd name="connsiteX1" fmla="*/ 618468 w 3255095"/>
-              <a:gd name="connsiteY1" fmla="*/ 0 h 18288"/>
-              <a:gd name="connsiteX2" fmla="*/ 1269487 w 3255095"/>
-              <a:gd name="connsiteY2" fmla="*/ 0 h 18288"/>
-              <a:gd name="connsiteX3" fmla="*/ 1953057 w 3255095"/>
-              <a:gd name="connsiteY3" fmla="*/ 0 h 18288"/>
-              <a:gd name="connsiteX4" fmla="*/ 2636627 w 3255095"/>
-              <a:gd name="connsiteY4" fmla="*/ 0 h 18288"/>
-              <a:gd name="connsiteX5" fmla="*/ 3255095 w 3255095"/>
-              <a:gd name="connsiteY5" fmla="*/ 0 h 18288"/>
-              <a:gd name="connsiteX6" fmla="*/ 3255095 w 3255095"/>
-              <a:gd name="connsiteY6" fmla="*/ 18288 h 18288"/>
-              <a:gd name="connsiteX7" fmla="*/ 2538974 w 3255095"/>
-              <a:gd name="connsiteY7" fmla="*/ 18288 h 18288"/>
-              <a:gd name="connsiteX8" fmla="*/ 1822853 w 3255095"/>
-              <a:gd name="connsiteY8" fmla="*/ 18288 h 18288"/>
-              <a:gd name="connsiteX9" fmla="*/ 1171834 w 3255095"/>
-              <a:gd name="connsiteY9" fmla="*/ 18288 h 18288"/>
-              <a:gd name="connsiteX10" fmla="*/ 0 w 3255095"/>
-              <a:gd name="connsiteY10" fmla="*/ 18288 h 18288"/>
-              <a:gd name="connsiteX11" fmla="*/ 0 w 3255095"/>
-              <a:gd name="connsiteY11" fmla="*/ 0 h 18288"/>
-            </a:gdLst>
-            <a:ahLst/>
-            <a:cxnLst>
-              <a:cxn ang="0">
-                <a:pos x="connsiteX0" y="connsiteY0"/>
-              </a:cxn>
-              <a:cxn ang="0">
-                <a:pos x="connsiteX1" y="connsiteY1"/>
-              </a:cxn>
-              <a:cxn ang="0">
-                <a:pos x="connsiteX2" y="connsiteY2"/>
-              </a:cxn>
-              <a:cxn ang="0">
-                <a:pos x="connsiteX3" y="connsiteY3"/>
-              </a:cxn>
-              <a:cxn ang="0">
-                <a:pos x="connsiteX4" y="connsiteY4"/>
-              </a:cxn>
-              <a:cxn ang="0">
-                <a:pos x="connsiteX5" y="connsiteY5"/>
-              </a:cxn>
-              <a:cxn ang="0">
-                <a:pos x="connsiteX6" y="connsiteY6"/>
-              </a:cxn>
-              <a:cxn ang="0">
-                <a:pos x="connsiteX7" y="connsiteY7"/>
-              </a:cxn>
-              <a:cxn ang="0">
-                <a:pos x="connsiteX8" y="connsiteY8"/>
-              </a:cxn>
-              <a:cxn ang="0">
-                <a:pos x="connsiteX9" y="connsiteY9"/>
-              </a:cxn>
-              <a:cxn ang="0">
-                <a:pos x="connsiteX10" y="connsiteY10"/>
-              </a:cxn>
-              <a:cxn ang="0">
-                <a:pos x="connsiteX11" y="connsiteY11"/>
-              </a:cxn>
-            </a:cxnLst>
-            <a:rect l="l" t="t" r="r" b="b"/>
-            <a:pathLst>
-              <a:path w="3255095" h="18288" fill="none" extrusionOk="0">
-                <a:moveTo>
-                  <a:pt x="0" y="0"/>
-                </a:moveTo>
-                <a:cubicBezTo>
-                  <a:pt x="240201" y="-22123"/>
-                  <a:pt x="462021" y="-19623"/>
-                  <a:pt x="618468" y="0"/>
-                </a:cubicBezTo>
-                <a:cubicBezTo>
-                  <a:pt x="774915" y="19623"/>
-                  <a:pt x="974734" y="2035"/>
-                  <a:pt x="1269487" y="0"/>
-                </a:cubicBezTo>
-                <a:cubicBezTo>
-                  <a:pt x="1564240" y="-2035"/>
-                  <a:pt x="1733579" y="10639"/>
-                  <a:pt x="1953057" y="0"/>
-                </a:cubicBezTo>
-                <a:cubicBezTo>
-                  <a:pt x="2172535" y="-10639"/>
-                  <a:pt x="2453962" y="14018"/>
-                  <a:pt x="2636627" y="0"/>
-                </a:cubicBezTo>
-                <a:cubicBezTo>
-                  <a:pt x="2819292" y="-14018"/>
-                  <a:pt x="3121375" y="5399"/>
-                  <a:pt x="3255095" y="0"/>
-                </a:cubicBezTo>
-                <a:cubicBezTo>
-                  <a:pt x="3254386" y="8157"/>
-                  <a:pt x="3254682" y="12125"/>
-                  <a:pt x="3255095" y="18288"/>
-                </a:cubicBezTo>
-                <a:cubicBezTo>
-                  <a:pt x="3088545" y="23203"/>
-                  <a:pt x="2687475" y="7419"/>
-                  <a:pt x="2538974" y="18288"/>
-                </a:cubicBezTo>
-                <a:cubicBezTo>
-                  <a:pt x="2390473" y="29157"/>
-                  <a:pt x="2137381" y="-8959"/>
-                  <a:pt x="1822853" y="18288"/>
-                </a:cubicBezTo>
-                <a:cubicBezTo>
-                  <a:pt x="1508325" y="45535"/>
-                  <a:pt x="1466437" y="20385"/>
-                  <a:pt x="1171834" y="18288"/>
-                </a:cubicBezTo>
-                <a:cubicBezTo>
-                  <a:pt x="877231" y="16191"/>
-                  <a:pt x="561097" y="37643"/>
-                  <a:pt x="0" y="18288"/>
-                </a:cubicBezTo>
-                <a:cubicBezTo>
-                  <a:pt x="-46" y="12483"/>
-                  <a:pt x="-203" y="6491"/>
-                  <a:pt x="0" y="0"/>
-                </a:cubicBezTo>
-                <a:close/>
-              </a:path>
-              <a:path w="3255095" h="18288" stroke="0" extrusionOk="0">
-                <a:moveTo>
-                  <a:pt x="0" y="0"/>
-                </a:moveTo>
-                <a:cubicBezTo>
-                  <a:pt x="291965" y="19429"/>
-                  <a:pt x="363155" y="8568"/>
-                  <a:pt x="618468" y="0"/>
-                </a:cubicBezTo>
-                <a:cubicBezTo>
-                  <a:pt x="873781" y="-8568"/>
-                  <a:pt x="904459" y="-19505"/>
-                  <a:pt x="1171834" y="0"/>
-                </a:cubicBezTo>
-                <a:cubicBezTo>
-                  <a:pt x="1439209" y="19505"/>
-                  <a:pt x="1744369" y="9790"/>
-                  <a:pt x="1887955" y="0"/>
-                </a:cubicBezTo>
-                <a:cubicBezTo>
-                  <a:pt x="2031541" y="-9790"/>
-                  <a:pt x="2346378" y="21240"/>
-                  <a:pt x="2506423" y="0"/>
-                </a:cubicBezTo>
-                <a:cubicBezTo>
-                  <a:pt x="2666468" y="-21240"/>
-                  <a:pt x="2990257" y="30414"/>
-                  <a:pt x="3255095" y="0"/>
-                </a:cubicBezTo>
-                <a:cubicBezTo>
-                  <a:pt x="3254831" y="4493"/>
-                  <a:pt x="3255479" y="9472"/>
-                  <a:pt x="3255095" y="18288"/>
-                </a:cubicBezTo>
-                <a:cubicBezTo>
-                  <a:pt x="3120743" y="16690"/>
-                  <a:pt x="2759628" y="42462"/>
-                  <a:pt x="2604076" y="18288"/>
-                </a:cubicBezTo>
-                <a:cubicBezTo>
-                  <a:pt x="2448524" y="-5886"/>
-                  <a:pt x="2184336" y="19599"/>
-                  <a:pt x="1887955" y="18288"/>
-                </a:cubicBezTo>
-                <a:cubicBezTo>
-                  <a:pt x="1591574" y="16977"/>
-                  <a:pt x="1548845" y="6870"/>
-                  <a:pt x="1334589" y="18288"/>
-                </a:cubicBezTo>
-                <a:cubicBezTo>
-                  <a:pt x="1120333" y="29706"/>
-                  <a:pt x="996014" y="9662"/>
-                  <a:pt x="683570" y="18288"/>
-                </a:cubicBezTo>
-                <a:cubicBezTo>
-                  <a:pt x="371126" y="26914"/>
-                  <a:pt x="198687" y="16167"/>
-                  <a:pt x="0" y="18288"/>
-                </a:cubicBezTo>
-                <a:cubicBezTo>
-                  <a:pt x="843" y="9577"/>
-                  <a:pt x="371" y="6900"/>
-                  <a:pt x="0" y="0"/>
-                </a:cubicBezTo>
-                <a:close/>
-              </a:path>
-            </a:pathLst>
-          </a:custGeom>
-          <a:solidFill>
-            <a:schemeClr val="accent2"/>
-          </a:solidFill>
-          <a:ln w="38100" cap="rnd">
-            <a:solidFill>
-              <a:schemeClr val="accent2"/>
-            </a:solidFill>
-            <a:round/>
-            <a:extLst>
-              <a:ext uri="{C807C97D-BFC1-408E-A445-0C87EB9F89A2}">
-                <ask:lineSketchStyleProps xmlns:ask="http://schemas.microsoft.com/office/drawing/2018/sketchyshapes" sd="1219033472">
-                  <a:prstGeom prst="rect">
-                    <a:avLst/>
-                  </a:prstGeom>
-                  <ask:type>
-                    <ask:lineSketchFreehand/>
-                  </ask:type>
-                </ask:lineSketchStyleProps>
-              </a:ext>
-            </a:extLst>
-          </a:ln>
-        </p:spPr>
-        <p:style>
-          <a:lnRef idx="2">
-            <a:schemeClr val="accent1">
-              <a:shade val="50000"/>
-            </a:schemeClr>
-          </a:lnRef>
-          <a:fillRef idx="1">
-            <a:schemeClr val="accent1"/>
-          </a:fillRef>
-          <a:effectRef idx="0">
-            <a:schemeClr val="accent1"/>
-          </a:effectRef>
-          <a:fontRef idx="minor">
-            <a:schemeClr val="lt1"/>
-          </a:fontRef>
-        </p:style>
-        <p:txBody>
-          <a:bodyPr rtlCol="0" anchor="ctr"/>
-          <a:lstStyle/>
-          <a:p>
-            <a:pPr algn="ctr"/>
-            <a:endParaRPr lang="en-US"/>
-          </a:p>
-        </p:txBody>
-      </p:sp>
-      <p:sp>
-        <p:nvSpPr>
-          <p:cNvPr id="3" name="Subtitle 2">
-            <a:extLst>
-              <a:ext uri="{FF2B5EF4-FFF2-40B4-BE49-F238E27FC236}">
-                <a16:creationId xmlns:a16="http://schemas.microsoft.com/office/drawing/2014/main" id="{31DFE856-0313-5FCD-B353-7FD58304E16D}"/>
-              </a:ext>
-            </a:extLst>
-          </p:cNvPr>
-          <p:cNvSpPr>
-            <a:spLocks noGrp="1"/>
-          </p:cNvSpPr>
-          <p:nvPr>
-            <p:ph type="subTitle" idx="1"/>
-          </p:nvPr>
-        </p:nvSpPr>
-        <p:spPr>
-          <a:xfrm>
-            <a:off x="630936" y="2807208"/>
-            <a:ext cx="3429000" cy="3410712"/>
-          </a:xfrm>
-        </p:spPr>
-        <p:txBody>
-          <a:bodyPr vert="horz" lIns="91440" tIns="45720" rIns="91440" bIns="45720" rtlCol="0" anchor="t">
-            <a:normAutofit lnSpcReduction="10000"/>
-          </a:bodyPr>
-          <a:lstStyle/>
-          <a:p>
-            <a:pPr indent="-228600" algn="l">
-              <a:buFont typeface="Arial" panose="020B0604020202020204" pitchFamily="34" charset="0"/>
-              <a:buChar char="•"/>
-            </a:pPr>
-            <a:r>
-              <a:rPr lang="en-US" sz="2200" dirty="0"/>
-              <a:t>Smart contracts: </a:t>
-            </a:r>
-          </a:p>
-          <a:p>
-            <a:pPr lvl="1" indent="-228600" algn="l">
-              <a:buFont typeface="Arial" panose="020B0604020202020204" pitchFamily="34" charset="0"/>
-              <a:buChar char="•"/>
-            </a:pPr>
-            <a:r>
-              <a:rPr lang="en-US" sz="1800" dirty="0"/>
-              <a:t>Move</a:t>
-            </a:r>
-          </a:p>
-          <a:p>
-            <a:pPr indent="-228600" algn="l">
-              <a:buFont typeface="Arial" panose="020B0604020202020204" pitchFamily="34" charset="0"/>
-              <a:buChar char="•"/>
-            </a:pPr>
-            <a:r>
-              <a:rPr lang="en-US" sz="2200" dirty="0"/>
-              <a:t>Frontend: </a:t>
-            </a:r>
-          </a:p>
-          <a:p>
-            <a:pPr lvl="1" indent="-228600" algn="l">
-              <a:buFont typeface="Arial" panose="020B0604020202020204" pitchFamily="34" charset="0"/>
-              <a:buChar char="•"/>
-            </a:pPr>
-            <a:r>
-              <a:rPr lang="en-US" sz="1800" dirty="0"/>
-              <a:t>ReactJS</a:t>
-            </a:r>
-          </a:p>
-          <a:p>
-            <a:pPr lvl="1" indent="-228600" algn="l">
-              <a:buFont typeface="Arial" panose="020B0604020202020204" pitchFamily="34" charset="0"/>
-              <a:buChar char="•"/>
-            </a:pPr>
-            <a:r>
-              <a:rPr lang="en-US" sz="1800" dirty="0"/>
-              <a:t>docker</a:t>
-            </a:r>
-          </a:p>
-          <a:p>
-            <a:pPr indent="-228600" algn="l">
-              <a:buFont typeface="Arial" panose="020B0604020202020204" pitchFamily="34" charset="0"/>
-              <a:buChar char="•"/>
-            </a:pPr>
-            <a:r>
-              <a:rPr lang="en-US" sz="2200" dirty="0"/>
-              <a:t>Indexer: </a:t>
-            </a:r>
-          </a:p>
-          <a:p>
-            <a:pPr lvl="1" indent="-228600" algn="l">
-              <a:buFont typeface="Arial" panose="020B0604020202020204" pitchFamily="34" charset="0"/>
-              <a:buChar char="•"/>
-            </a:pPr>
-            <a:r>
-              <a:rPr lang="en-US" sz="1800" dirty="0" err="1"/>
-              <a:t>NodeJs</a:t>
-            </a:r>
-            <a:r>
-              <a:rPr lang="en-US" sz="1800" dirty="0"/>
-              <a:t> </a:t>
-            </a:r>
-          </a:p>
-          <a:p>
-            <a:pPr lvl="1" indent="-228600" algn="l">
-              <a:buFont typeface="Arial" panose="020B0604020202020204" pitchFamily="34" charset="0"/>
-              <a:buChar char="•"/>
-            </a:pPr>
-            <a:r>
-              <a:rPr lang="en-US" sz="1800" dirty="0"/>
-              <a:t>SUI </a:t>
-            </a:r>
-            <a:r>
-              <a:rPr lang="en-US" sz="1800" dirty="0" err="1"/>
-              <a:t>websockets</a:t>
-            </a:r>
-            <a:endParaRPr lang="en-US" sz="1800" dirty="0"/>
-          </a:p>
-          <a:p>
-            <a:pPr lvl="1" indent="-228600" algn="l">
-              <a:buFont typeface="Arial" panose="020B0604020202020204" pitchFamily="34" charset="0"/>
-              <a:buChar char="•"/>
-            </a:pPr>
-            <a:r>
-              <a:rPr lang="en-US" sz="1800" dirty="0"/>
-              <a:t>MongoDB</a:t>
-            </a:r>
-          </a:p>
-          <a:p>
-            <a:pPr lvl="1" indent="-228600" algn="l">
-              <a:buFont typeface="Arial" panose="020B0604020202020204" pitchFamily="34" charset="0"/>
-              <a:buChar char="•"/>
-            </a:pPr>
-            <a:r>
-              <a:rPr lang="en-US" sz="1800" dirty="0"/>
-              <a:t>docker</a:t>
-            </a:r>
-          </a:p>
-        </p:txBody>
-      </p:sp>
-      <p:pic>
-        <p:nvPicPr>
-          <p:cNvPr id="14" name="Picture 13" descr="A diagram of a computer server&#10;&#10;Description automatically generated">
-            <a:extLst>
-              <a:ext uri="{FF2B5EF4-FFF2-40B4-BE49-F238E27FC236}">
-                <a16:creationId xmlns:a16="http://schemas.microsoft.com/office/drawing/2014/main" id="{6692023A-B218-720E-26BD-C36D6F208685}"/>
-              </a:ext>
-            </a:extLst>
-          </p:cNvPr>
-          <p:cNvPicPr>
-            <a:picLocks noChangeAspect="1"/>
-          </p:cNvPicPr>
-          <p:nvPr/>
-        </p:nvPicPr>
-        <p:blipFill>
-          <a:blip r:embed="rId2"/>
-          <a:stretch>
-            <a:fillRect/>
-          </a:stretch>
-        </p:blipFill>
-        <p:spPr>
-          <a:xfrm>
-            <a:off x="4654296" y="1116255"/>
-            <a:ext cx="6903720" cy="4625490"/>
-          </a:xfrm>
-          <a:prstGeom prst="rect">
-            <a:avLst/>
-          </a:prstGeom>
-        </p:spPr>
-      </p:pic>
-    </p:spTree>
-    <p:extLst>
-      <p:ext uri="{BB962C8B-B14F-4D97-AF65-F5344CB8AC3E}">
-        <p14:creationId xmlns:p14="http://schemas.microsoft.com/office/powerpoint/2010/main" val="1034258263"/>
       </p:ext>
     </p:extLst>
   </p:cSld>

</xml_diff>